<commit_message>
Refactored db package: interfaces separated from implementation
</commit_message>
<xml_diff>
--- a/documentation/Презентация.pptx
+++ b/documentation/Презентация.pptx
@@ -275,7 +275,7 @@
           <a:p>
             <a:fld id="{DFDC5825-BEEA-4DDA-87C1-6098A06A90A8}" type="datetimeFigureOut">
               <a:rPr lang="en-US" smtClean="0"/>
-              <a:t>9/19/2016</a:t>
+              <a:t>9/20/2016</a:t>
             </a:fld>
             <a:endParaRPr lang="en-US"/>
           </a:p>
@@ -445,7 +445,7 @@
           <a:p>
             <a:fld id="{DFDC5825-BEEA-4DDA-87C1-6098A06A90A8}" type="datetimeFigureOut">
               <a:rPr lang="en-US" smtClean="0"/>
-              <a:t>9/19/2016</a:t>
+              <a:t>9/20/2016</a:t>
             </a:fld>
             <a:endParaRPr lang="en-US"/>
           </a:p>
@@ -625,7 +625,7 @@
           <a:p>
             <a:fld id="{DFDC5825-BEEA-4DDA-87C1-6098A06A90A8}" type="datetimeFigureOut">
               <a:rPr lang="en-US" smtClean="0"/>
-              <a:t>9/19/2016</a:t>
+              <a:t>9/20/2016</a:t>
             </a:fld>
             <a:endParaRPr lang="en-US"/>
           </a:p>
@@ -795,7 +795,7 @@
           <a:p>
             <a:fld id="{DFDC5825-BEEA-4DDA-87C1-6098A06A90A8}" type="datetimeFigureOut">
               <a:rPr lang="en-US" smtClean="0"/>
-              <a:t>9/19/2016</a:t>
+              <a:t>9/20/2016</a:t>
             </a:fld>
             <a:endParaRPr lang="en-US"/>
           </a:p>
@@ -1041,7 +1041,7 @@
           <a:p>
             <a:fld id="{DFDC5825-BEEA-4DDA-87C1-6098A06A90A8}" type="datetimeFigureOut">
               <a:rPr lang="en-US" smtClean="0"/>
-              <a:t>9/19/2016</a:t>
+              <a:t>9/20/2016</a:t>
             </a:fld>
             <a:endParaRPr lang="en-US"/>
           </a:p>
@@ -1273,7 +1273,7 @@
           <a:p>
             <a:fld id="{DFDC5825-BEEA-4DDA-87C1-6098A06A90A8}" type="datetimeFigureOut">
               <a:rPr lang="en-US" smtClean="0"/>
-              <a:t>9/19/2016</a:t>
+              <a:t>9/20/2016</a:t>
             </a:fld>
             <a:endParaRPr lang="en-US"/>
           </a:p>
@@ -1640,7 +1640,7 @@
           <a:p>
             <a:fld id="{DFDC5825-BEEA-4DDA-87C1-6098A06A90A8}" type="datetimeFigureOut">
               <a:rPr lang="en-US" smtClean="0"/>
-              <a:t>9/19/2016</a:t>
+              <a:t>9/20/2016</a:t>
             </a:fld>
             <a:endParaRPr lang="en-US"/>
           </a:p>
@@ -1758,7 +1758,7 @@
           <a:p>
             <a:fld id="{DFDC5825-BEEA-4DDA-87C1-6098A06A90A8}" type="datetimeFigureOut">
               <a:rPr lang="en-US" smtClean="0"/>
-              <a:t>9/19/2016</a:t>
+              <a:t>9/20/2016</a:t>
             </a:fld>
             <a:endParaRPr lang="en-US"/>
           </a:p>
@@ -1853,7 +1853,7 @@
           <a:p>
             <a:fld id="{DFDC5825-BEEA-4DDA-87C1-6098A06A90A8}" type="datetimeFigureOut">
               <a:rPr lang="en-US" smtClean="0"/>
-              <a:t>9/19/2016</a:t>
+              <a:t>9/20/2016</a:t>
             </a:fld>
             <a:endParaRPr lang="en-US"/>
           </a:p>
@@ -2130,7 +2130,7 @@
           <a:p>
             <a:fld id="{DFDC5825-BEEA-4DDA-87C1-6098A06A90A8}" type="datetimeFigureOut">
               <a:rPr lang="en-US" smtClean="0"/>
-              <a:t>9/19/2016</a:t>
+              <a:t>9/20/2016</a:t>
             </a:fld>
             <a:endParaRPr lang="en-US"/>
           </a:p>
@@ -2383,7 +2383,7 @@
           <a:p>
             <a:fld id="{DFDC5825-BEEA-4DDA-87C1-6098A06A90A8}" type="datetimeFigureOut">
               <a:rPr lang="en-US" smtClean="0"/>
-              <a:t>9/19/2016</a:t>
+              <a:t>9/20/2016</a:t>
             </a:fld>
             <a:endParaRPr lang="en-US"/>
           </a:p>
@@ -2613,7 +2613,7 @@
           <a:p>
             <a:fld id="{DFDC5825-BEEA-4DDA-87C1-6098A06A90A8}" type="datetimeFigureOut">
               <a:rPr lang="en-US" smtClean="0"/>
-              <a:t>9/19/2016</a:t>
+              <a:t>9/20/2016</a:t>
             </a:fld>
             <a:endParaRPr lang="en-US"/>
           </a:p>
@@ -6849,33 +6849,15 @@
                                   </p:childTnLst>
                                 </p:cTn>
                               </p:par>
-                            </p:childTnLst>
-                          </p:cTn>
-                        </p:par>
-                      </p:childTnLst>
-                    </p:cTn>
-                  </p:par>
-                  <p:par>
-                    <p:cTn id="54" fill="hold">
-                      <p:stCondLst>
-                        <p:cond delay="indefinite"/>
-                      </p:stCondLst>
-                      <p:childTnLst>
-                        <p:par>
-                          <p:cTn id="55" fill="hold">
-                            <p:stCondLst>
-                              <p:cond delay="0"/>
-                            </p:stCondLst>
-                            <p:childTnLst>
                               <p:par>
-                                <p:cTn id="56" presetID="10" presetClass="exit" presetSubtype="0" fill="hold" grpId="0" nodeType="clickEffect">
+                                <p:cTn id="54" presetID="10" presetClass="exit" presetSubtype="0" fill="hold" grpId="0" nodeType="withEffect">
                                   <p:stCondLst>
                                     <p:cond delay="0"/>
                                   </p:stCondLst>
                                   <p:childTnLst>
                                     <p:animEffect transition="out" filter="fade">
                                       <p:cBhvr>
-                                        <p:cTn id="57" dur="500"/>
+                                        <p:cTn id="55" dur="500"/>
                                         <p:tgtEl>
                                           <p:spTgt spid="6">
                                             <p:txEl>
@@ -6887,7 +6869,7 @@
                                     </p:animEffect>
                                     <p:set>
                                       <p:cBhvr>
-                                        <p:cTn id="58" dur="1" fill="hold">
+                                        <p:cTn id="56" dur="1" fill="hold">
                                           <p:stCondLst>
                                             <p:cond delay="499"/>
                                           </p:stCondLst>
@@ -6941,7 +6923,7 @@
       <p:bldP spid="5" grpId="0" build="p"/>
       <p:bldP spid="5" grpId="1" build="p"/>
       <p:bldP spid="5" grpId="2" build="p"/>
-      <p:bldP spid="6" grpId="0" build="p"/>
+      <p:bldP spid="6" grpId="0" uiExpand="1" build="p"/>
     </p:bldLst>
   </p:timing>
 </p:sld>

</xml_diff>

<commit_message>
Removed redundant Sender class and documented the code
</commit_message>
<xml_diff>
--- a/documentation/Презентация.pptx
+++ b/documentation/Презентация.pptx
@@ -6,12 +6,14 @@
   </p:sldMasterIdLst>
   <p:sldIdLst>
     <p:sldId id="256" r:id="rId2"/>
-    <p:sldId id="258" r:id="rId3"/>
-    <p:sldId id="260" r:id="rId4"/>
-    <p:sldId id="261" r:id="rId5"/>
-    <p:sldId id="262" r:id="rId6"/>
-    <p:sldId id="263" r:id="rId7"/>
-    <p:sldId id="264" r:id="rId8"/>
+    <p:sldId id="265" r:id="rId3"/>
+    <p:sldId id="266" r:id="rId4"/>
+    <p:sldId id="258" r:id="rId5"/>
+    <p:sldId id="260" r:id="rId6"/>
+    <p:sldId id="261" r:id="rId7"/>
+    <p:sldId id="262" r:id="rId8"/>
+    <p:sldId id="263" r:id="rId9"/>
+    <p:sldId id="264" r:id="rId10"/>
   </p:sldIdLst>
   <p:sldSz cx="12192000" cy="6858000"/>
   <p:notesSz cx="6858000" cy="9144000"/>
@@ -116,6 +118,8 @@
         <p14:section name="Раздел по умолчанию" id="{6A960F2A-448A-4A1A-853F-156608C364EE}">
           <p14:sldIdLst>
             <p14:sldId id="256"/>
+            <p14:sldId id="265"/>
+            <p14:sldId id="266"/>
             <p14:sldId id="258"/>
             <p14:sldId id="260"/>
             <p14:sldId id="261"/>
@@ -275,7 +279,7 @@
           <a:p>
             <a:fld id="{DFDC5825-BEEA-4DDA-87C1-6098A06A90A8}" type="datetimeFigureOut">
               <a:rPr lang="en-US" smtClean="0"/>
-              <a:t>9/20/2016</a:t>
+              <a:t>10/2/2016</a:t>
             </a:fld>
             <a:endParaRPr lang="en-US"/>
           </a:p>
@@ -445,7 +449,7 @@
           <a:p>
             <a:fld id="{DFDC5825-BEEA-4DDA-87C1-6098A06A90A8}" type="datetimeFigureOut">
               <a:rPr lang="en-US" smtClean="0"/>
-              <a:t>9/20/2016</a:t>
+              <a:t>10/2/2016</a:t>
             </a:fld>
             <a:endParaRPr lang="en-US"/>
           </a:p>
@@ -625,7 +629,7 @@
           <a:p>
             <a:fld id="{DFDC5825-BEEA-4DDA-87C1-6098A06A90A8}" type="datetimeFigureOut">
               <a:rPr lang="en-US" smtClean="0"/>
-              <a:t>9/20/2016</a:t>
+              <a:t>10/2/2016</a:t>
             </a:fld>
             <a:endParaRPr lang="en-US"/>
           </a:p>
@@ -795,7 +799,7 @@
           <a:p>
             <a:fld id="{DFDC5825-BEEA-4DDA-87C1-6098A06A90A8}" type="datetimeFigureOut">
               <a:rPr lang="en-US" smtClean="0"/>
-              <a:t>9/20/2016</a:t>
+              <a:t>10/2/2016</a:t>
             </a:fld>
             <a:endParaRPr lang="en-US"/>
           </a:p>
@@ -1041,7 +1045,7 @@
           <a:p>
             <a:fld id="{DFDC5825-BEEA-4DDA-87C1-6098A06A90A8}" type="datetimeFigureOut">
               <a:rPr lang="en-US" smtClean="0"/>
-              <a:t>9/20/2016</a:t>
+              <a:t>10/2/2016</a:t>
             </a:fld>
             <a:endParaRPr lang="en-US"/>
           </a:p>
@@ -1273,7 +1277,7 @@
           <a:p>
             <a:fld id="{DFDC5825-BEEA-4DDA-87C1-6098A06A90A8}" type="datetimeFigureOut">
               <a:rPr lang="en-US" smtClean="0"/>
-              <a:t>9/20/2016</a:t>
+              <a:t>10/2/2016</a:t>
             </a:fld>
             <a:endParaRPr lang="en-US"/>
           </a:p>
@@ -1640,7 +1644,7 @@
           <a:p>
             <a:fld id="{DFDC5825-BEEA-4DDA-87C1-6098A06A90A8}" type="datetimeFigureOut">
               <a:rPr lang="en-US" smtClean="0"/>
-              <a:t>9/20/2016</a:t>
+              <a:t>10/2/2016</a:t>
             </a:fld>
             <a:endParaRPr lang="en-US"/>
           </a:p>
@@ -1758,7 +1762,7 @@
           <a:p>
             <a:fld id="{DFDC5825-BEEA-4DDA-87C1-6098A06A90A8}" type="datetimeFigureOut">
               <a:rPr lang="en-US" smtClean="0"/>
-              <a:t>9/20/2016</a:t>
+              <a:t>10/2/2016</a:t>
             </a:fld>
             <a:endParaRPr lang="en-US"/>
           </a:p>
@@ -1853,7 +1857,7 @@
           <a:p>
             <a:fld id="{DFDC5825-BEEA-4DDA-87C1-6098A06A90A8}" type="datetimeFigureOut">
               <a:rPr lang="en-US" smtClean="0"/>
-              <a:t>9/20/2016</a:t>
+              <a:t>10/2/2016</a:t>
             </a:fld>
             <a:endParaRPr lang="en-US"/>
           </a:p>
@@ -2130,7 +2134,7 @@
           <a:p>
             <a:fld id="{DFDC5825-BEEA-4DDA-87C1-6098A06A90A8}" type="datetimeFigureOut">
               <a:rPr lang="en-US" smtClean="0"/>
-              <a:t>9/20/2016</a:t>
+              <a:t>10/2/2016</a:t>
             </a:fld>
             <a:endParaRPr lang="en-US"/>
           </a:p>
@@ -2383,7 +2387,7 @@
           <a:p>
             <a:fld id="{DFDC5825-BEEA-4DDA-87C1-6098A06A90A8}" type="datetimeFigureOut">
               <a:rPr lang="en-US" smtClean="0"/>
-              <a:t>9/20/2016</a:t>
+              <a:t>10/2/2016</a:t>
             </a:fld>
             <a:endParaRPr lang="en-US"/>
           </a:p>
@@ -2613,7 +2617,7 @@
           <a:p>
             <a:fld id="{DFDC5825-BEEA-4DDA-87C1-6098A06A90A8}" type="datetimeFigureOut">
               <a:rPr lang="en-US" smtClean="0"/>
-              <a:t>9/20/2016</a:t>
+              <a:t>10/2/2016</a:t>
             </a:fld>
             <a:endParaRPr lang="en-US"/>
           </a:p>
@@ -3255,6 +3259,1467 @@
       </p:grpSpPr>
       <p:pic>
         <p:nvPicPr>
+          <p:cNvPr id="5" name="Рисунок 4"/>
+          <p:cNvPicPr>
+            <a:picLocks noChangeAspect="1"/>
+          </p:cNvPicPr>
+          <p:nvPr/>
+        </p:nvPicPr>
+        <p:blipFill>
+          <a:blip r:embed="rId2">
+            <a:extLst>
+              <a:ext uri="{28A0092B-C50C-407E-A947-70E740481C1C}">
+                <a14:useLocalDpi xmlns:a14="http://schemas.microsoft.com/office/drawing/2010/main" val="0"/>
+              </a:ext>
+            </a:extLst>
+          </a:blip>
+          <a:stretch>
+            <a:fillRect/>
+          </a:stretch>
+        </p:blipFill>
+        <p:spPr>
+          <a:xfrm>
+            <a:off x="4108348" y="1441348"/>
+            <a:ext cx="3975304" cy="3975304"/>
+          </a:xfrm>
+          <a:prstGeom prst="rect">
+            <a:avLst/>
+          </a:prstGeom>
+        </p:spPr>
+      </p:pic>
+      <p:pic>
+        <p:nvPicPr>
+          <p:cNvPr id="7" name="Рисунок 6"/>
+          <p:cNvPicPr>
+            <a:picLocks noChangeAspect="1"/>
+          </p:cNvPicPr>
+          <p:nvPr/>
+        </p:nvPicPr>
+        <p:blipFill>
+          <a:blip r:embed="rId3" cstate="print">
+            <a:extLst>
+              <a:ext uri="{28A0092B-C50C-407E-A947-70E740481C1C}">
+                <a14:useLocalDpi xmlns:a14="http://schemas.microsoft.com/office/drawing/2010/main" val="0"/>
+              </a:ext>
+            </a:extLst>
+          </a:blip>
+          <a:stretch>
+            <a:fillRect/>
+          </a:stretch>
+        </p:blipFill>
+        <p:spPr>
+          <a:xfrm>
+            <a:off x="847344" y="973836"/>
+            <a:ext cx="4910328" cy="4910328"/>
+          </a:xfrm>
+          <a:prstGeom prst="rect">
+            <a:avLst/>
+          </a:prstGeom>
+        </p:spPr>
+      </p:pic>
+      <p:pic>
+        <p:nvPicPr>
+          <p:cNvPr id="9" name="Рисунок 8"/>
+          <p:cNvPicPr>
+            <a:picLocks noChangeAspect="1"/>
+          </p:cNvPicPr>
+          <p:nvPr/>
+        </p:nvPicPr>
+        <p:blipFill>
+          <a:blip r:embed="rId4" cstate="print">
+            <a:extLst>
+              <a:ext uri="{28A0092B-C50C-407E-A947-70E740481C1C}">
+                <a14:useLocalDpi xmlns:a14="http://schemas.microsoft.com/office/drawing/2010/main" val="0"/>
+              </a:ext>
+            </a:extLst>
+          </a:blip>
+          <a:stretch>
+            <a:fillRect/>
+          </a:stretch>
+        </p:blipFill>
+        <p:spPr>
+          <a:xfrm>
+            <a:off x="6563512" y="973836"/>
+            <a:ext cx="4910328" cy="4910328"/>
+          </a:xfrm>
+          <a:prstGeom prst="rect">
+            <a:avLst/>
+          </a:prstGeom>
+        </p:spPr>
+      </p:pic>
+      <p:sp>
+        <p:nvSpPr>
+          <p:cNvPr id="11" name="Стрелка вправо 10"/>
+          <p:cNvSpPr/>
+          <p:nvPr/>
+        </p:nvSpPr>
+        <p:spPr>
+          <a:xfrm>
+            <a:off x="5026736" y="2885113"/>
+            <a:ext cx="1748968" cy="1087773"/>
+          </a:xfrm>
+          <a:prstGeom prst="rightArrow">
+            <a:avLst/>
+          </a:prstGeom>
+          <a:ln>
+            <a:solidFill>
+              <a:schemeClr val="bg1"/>
+            </a:solidFill>
+          </a:ln>
+        </p:spPr>
+        <p:style>
+          <a:lnRef idx="2">
+            <a:schemeClr val="accent6"/>
+          </a:lnRef>
+          <a:fillRef idx="1">
+            <a:schemeClr val="lt1"/>
+          </a:fillRef>
+          <a:effectRef idx="0">
+            <a:schemeClr val="accent6"/>
+          </a:effectRef>
+          <a:fontRef idx="minor">
+            <a:schemeClr val="dk1"/>
+          </a:fontRef>
+        </p:style>
+        <p:txBody>
+          <a:bodyPr rtlCol="0" anchor="ctr"/>
+          <a:lstStyle/>
+          <a:p>
+            <a:pPr algn="ctr"/>
+            <a:endParaRPr lang="en-US"/>
+          </a:p>
+        </p:txBody>
+      </p:sp>
+    </p:spTree>
+    <p:extLst>
+      <p:ext uri="{BB962C8B-B14F-4D97-AF65-F5344CB8AC3E}">
+        <p14:creationId xmlns:p14="http://schemas.microsoft.com/office/powerpoint/2010/main" val="3937076462"/>
+      </p:ext>
+    </p:extLst>
+  </p:cSld>
+  <p:clrMapOvr>
+    <a:masterClrMapping/>
+  </p:clrMapOvr>
+  <p:timing>
+    <p:tnLst>
+      <p:par>
+        <p:cTn id="1" dur="indefinite" restart="never" nodeType="tmRoot">
+          <p:childTnLst>
+            <p:seq concurrent="1" nextAc="seek">
+              <p:cTn id="2" dur="indefinite" nodeType="mainSeq">
+                <p:childTnLst>
+                  <p:par>
+                    <p:cTn id="3" fill="hold">
+                      <p:stCondLst>
+                        <p:cond delay="indefinite"/>
+                        <p:cond evt="onBegin" delay="0">
+                          <p:tn val="2"/>
+                        </p:cond>
+                      </p:stCondLst>
+                      <p:childTnLst>
+                        <p:par>
+                          <p:cTn id="4" fill="hold">
+                            <p:stCondLst>
+                              <p:cond delay="0"/>
+                            </p:stCondLst>
+                            <p:childTnLst>
+                              <p:par>
+                                <p:cTn id="5" presetID="10" presetClass="entr" presetSubtype="0" fill="hold" nodeType="afterEffect">
+                                  <p:stCondLst>
+                                    <p:cond delay="0"/>
+                                  </p:stCondLst>
+                                  <p:childTnLst>
+                                    <p:set>
+                                      <p:cBhvr>
+                                        <p:cTn id="6" dur="1" fill="hold">
+                                          <p:stCondLst>
+                                            <p:cond delay="0"/>
+                                          </p:stCondLst>
+                                        </p:cTn>
+                                        <p:tgtEl>
+                                          <p:spTgt spid="5"/>
+                                        </p:tgtEl>
+                                        <p:attrNameLst>
+                                          <p:attrName>style.visibility</p:attrName>
+                                        </p:attrNameLst>
+                                      </p:cBhvr>
+                                      <p:to>
+                                        <p:strVal val="visible"/>
+                                      </p:to>
+                                    </p:set>
+                                    <p:animEffect transition="in" filter="fade">
+                                      <p:cBhvr>
+                                        <p:cTn id="7" dur="500"/>
+                                        <p:tgtEl>
+                                          <p:spTgt spid="5"/>
+                                        </p:tgtEl>
+                                      </p:cBhvr>
+                                    </p:animEffect>
+                                  </p:childTnLst>
+                                </p:cTn>
+                              </p:par>
+                            </p:childTnLst>
+                          </p:cTn>
+                        </p:par>
+                      </p:childTnLst>
+                    </p:cTn>
+                  </p:par>
+                  <p:par>
+                    <p:cTn id="8" fill="hold">
+                      <p:stCondLst>
+                        <p:cond delay="indefinite"/>
+                      </p:stCondLst>
+                      <p:childTnLst>
+                        <p:par>
+                          <p:cTn id="9" fill="hold">
+                            <p:stCondLst>
+                              <p:cond delay="0"/>
+                            </p:stCondLst>
+                            <p:childTnLst>
+                              <p:par>
+                                <p:cTn id="10" presetID="10" presetClass="exit" presetSubtype="0" fill="hold" nodeType="clickEffect">
+                                  <p:stCondLst>
+                                    <p:cond delay="0"/>
+                                  </p:stCondLst>
+                                  <p:childTnLst>
+                                    <p:animEffect transition="out" filter="fade">
+                                      <p:cBhvr>
+                                        <p:cTn id="11" dur="500"/>
+                                        <p:tgtEl>
+                                          <p:spTgt spid="5"/>
+                                        </p:tgtEl>
+                                      </p:cBhvr>
+                                    </p:animEffect>
+                                    <p:set>
+                                      <p:cBhvr>
+                                        <p:cTn id="12" dur="1" fill="hold">
+                                          <p:stCondLst>
+                                            <p:cond delay="499"/>
+                                          </p:stCondLst>
+                                        </p:cTn>
+                                        <p:tgtEl>
+                                          <p:spTgt spid="5"/>
+                                        </p:tgtEl>
+                                        <p:attrNameLst>
+                                          <p:attrName>style.visibility</p:attrName>
+                                        </p:attrNameLst>
+                                      </p:cBhvr>
+                                      <p:to>
+                                        <p:strVal val="hidden"/>
+                                      </p:to>
+                                    </p:set>
+                                  </p:childTnLst>
+                                </p:cTn>
+                              </p:par>
+                            </p:childTnLst>
+                          </p:cTn>
+                        </p:par>
+                        <p:par>
+                          <p:cTn id="13" fill="hold">
+                            <p:stCondLst>
+                              <p:cond delay="500"/>
+                            </p:stCondLst>
+                            <p:childTnLst>
+                              <p:par>
+                                <p:cTn id="14" presetID="10" presetClass="entr" presetSubtype="0" fill="hold" nodeType="afterEffect">
+                                  <p:stCondLst>
+                                    <p:cond delay="0"/>
+                                  </p:stCondLst>
+                                  <p:childTnLst>
+                                    <p:set>
+                                      <p:cBhvr>
+                                        <p:cTn id="15" dur="1" fill="hold">
+                                          <p:stCondLst>
+                                            <p:cond delay="0"/>
+                                          </p:stCondLst>
+                                        </p:cTn>
+                                        <p:tgtEl>
+                                          <p:spTgt spid="7"/>
+                                        </p:tgtEl>
+                                        <p:attrNameLst>
+                                          <p:attrName>style.visibility</p:attrName>
+                                        </p:attrNameLst>
+                                      </p:cBhvr>
+                                      <p:to>
+                                        <p:strVal val="visible"/>
+                                      </p:to>
+                                    </p:set>
+                                    <p:animEffect transition="in" filter="fade">
+                                      <p:cBhvr>
+                                        <p:cTn id="16" dur="500"/>
+                                        <p:tgtEl>
+                                          <p:spTgt spid="7"/>
+                                        </p:tgtEl>
+                                      </p:cBhvr>
+                                    </p:animEffect>
+                                  </p:childTnLst>
+                                </p:cTn>
+                              </p:par>
+                            </p:childTnLst>
+                          </p:cTn>
+                        </p:par>
+                      </p:childTnLst>
+                    </p:cTn>
+                  </p:par>
+                  <p:par>
+                    <p:cTn id="17" fill="hold">
+                      <p:stCondLst>
+                        <p:cond delay="indefinite"/>
+                      </p:stCondLst>
+                      <p:childTnLst>
+                        <p:par>
+                          <p:cTn id="18" fill="hold">
+                            <p:stCondLst>
+                              <p:cond delay="0"/>
+                            </p:stCondLst>
+                            <p:childTnLst>
+                              <p:par>
+                                <p:cTn id="19" presetID="10" presetClass="entr" presetSubtype="0" fill="hold" grpId="0" nodeType="clickEffect">
+                                  <p:stCondLst>
+                                    <p:cond delay="0"/>
+                                  </p:stCondLst>
+                                  <p:childTnLst>
+                                    <p:set>
+                                      <p:cBhvr>
+                                        <p:cTn id="20" dur="1" fill="hold">
+                                          <p:stCondLst>
+                                            <p:cond delay="0"/>
+                                          </p:stCondLst>
+                                        </p:cTn>
+                                        <p:tgtEl>
+                                          <p:spTgt spid="11"/>
+                                        </p:tgtEl>
+                                        <p:attrNameLst>
+                                          <p:attrName>style.visibility</p:attrName>
+                                        </p:attrNameLst>
+                                      </p:cBhvr>
+                                      <p:to>
+                                        <p:strVal val="visible"/>
+                                      </p:to>
+                                    </p:set>
+                                    <p:animEffect transition="in" filter="fade">
+                                      <p:cBhvr>
+                                        <p:cTn id="21" dur="500"/>
+                                        <p:tgtEl>
+                                          <p:spTgt spid="11"/>
+                                        </p:tgtEl>
+                                      </p:cBhvr>
+                                    </p:animEffect>
+                                  </p:childTnLst>
+                                </p:cTn>
+                              </p:par>
+                            </p:childTnLst>
+                          </p:cTn>
+                        </p:par>
+                        <p:par>
+                          <p:cTn id="22" fill="hold">
+                            <p:stCondLst>
+                              <p:cond delay="500"/>
+                            </p:stCondLst>
+                            <p:childTnLst>
+                              <p:par>
+                                <p:cTn id="23" presetID="10" presetClass="entr" presetSubtype="0" fill="hold" nodeType="afterEffect">
+                                  <p:stCondLst>
+                                    <p:cond delay="1500"/>
+                                  </p:stCondLst>
+                                  <p:childTnLst>
+                                    <p:set>
+                                      <p:cBhvr>
+                                        <p:cTn id="24" dur="1" fill="hold">
+                                          <p:stCondLst>
+                                            <p:cond delay="0"/>
+                                          </p:stCondLst>
+                                        </p:cTn>
+                                        <p:tgtEl>
+                                          <p:spTgt spid="9"/>
+                                        </p:tgtEl>
+                                        <p:attrNameLst>
+                                          <p:attrName>style.visibility</p:attrName>
+                                        </p:attrNameLst>
+                                      </p:cBhvr>
+                                      <p:to>
+                                        <p:strVal val="visible"/>
+                                      </p:to>
+                                    </p:set>
+                                    <p:animEffect transition="in" filter="fade">
+                                      <p:cBhvr>
+                                        <p:cTn id="25" dur="500"/>
+                                        <p:tgtEl>
+                                          <p:spTgt spid="9"/>
+                                        </p:tgtEl>
+                                      </p:cBhvr>
+                                    </p:animEffect>
+                                  </p:childTnLst>
+                                </p:cTn>
+                              </p:par>
+                            </p:childTnLst>
+                          </p:cTn>
+                        </p:par>
+                      </p:childTnLst>
+                    </p:cTn>
+                  </p:par>
+                  <p:par>
+                    <p:cTn id="26" fill="hold">
+                      <p:stCondLst>
+                        <p:cond delay="indefinite"/>
+                      </p:stCondLst>
+                      <p:childTnLst>
+                        <p:par>
+                          <p:cTn id="27" fill="hold">
+                            <p:stCondLst>
+                              <p:cond delay="0"/>
+                            </p:stCondLst>
+                            <p:childTnLst>
+                              <p:par>
+                                <p:cTn id="28" presetID="10" presetClass="exit" presetSubtype="0" fill="hold" nodeType="clickEffect">
+                                  <p:stCondLst>
+                                    <p:cond delay="0"/>
+                                  </p:stCondLst>
+                                  <p:childTnLst>
+                                    <p:animEffect transition="out" filter="fade">
+                                      <p:cBhvr>
+                                        <p:cTn id="29" dur="500"/>
+                                        <p:tgtEl>
+                                          <p:spTgt spid="7"/>
+                                        </p:tgtEl>
+                                      </p:cBhvr>
+                                    </p:animEffect>
+                                    <p:set>
+                                      <p:cBhvr>
+                                        <p:cTn id="30" dur="1" fill="hold">
+                                          <p:stCondLst>
+                                            <p:cond delay="499"/>
+                                          </p:stCondLst>
+                                        </p:cTn>
+                                        <p:tgtEl>
+                                          <p:spTgt spid="7"/>
+                                        </p:tgtEl>
+                                        <p:attrNameLst>
+                                          <p:attrName>style.visibility</p:attrName>
+                                        </p:attrNameLst>
+                                      </p:cBhvr>
+                                      <p:to>
+                                        <p:strVal val="hidden"/>
+                                      </p:to>
+                                    </p:set>
+                                  </p:childTnLst>
+                                </p:cTn>
+                              </p:par>
+                              <p:par>
+                                <p:cTn id="31" presetID="10" presetClass="exit" presetSubtype="0" fill="hold" nodeType="withEffect">
+                                  <p:stCondLst>
+                                    <p:cond delay="0"/>
+                                  </p:stCondLst>
+                                  <p:childTnLst>
+                                    <p:animEffect transition="out" filter="fade">
+                                      <p:cBhvr>
+                                        <p:cTn id="32" dur="500"/>
+                                        <p:tgtEl>
+                                          <p:spTgt spid="9"/>
+                                        </p:tgtEl>
+                                      </p:cBhvr>
+                                    </p:animEffect>
+                                    <p:set>
+                                      <p:cBhvr>
+                                        <p:cTn id="33" dur="1" fill="hold">
+                                          <p:stCondLst>
+                                            <p:cond delay="499"/>
+                                          </p:stCondLst>
+                                        </p:cTn>
+                                        <p:tgtEl>
+                                          <p:spTgt spid="9"/>
+                                        </p:tgtEl>
+                                        <p:attrNameLst>
+                                          <p:attrName>style.visibility</p:attrName>
+                                        </p:attrNameLst>
+                                      </p:cBhvr>
+                                      <p:to>
+                                        <p:strVal val="hidden"/>
+                                      </p:to>
+                                    </p:set>
+                                  </p:childTnLst>
+                                </p:cTn>
+                              </p:par>
+                              <p:par>
+                                <p:cTn id="34" presetID="10" presetClass="exit" presetSubtype="0" fill="hold" grpId="1" nodeType="withEffect">
+                                  <p:stCondLst>
+                                    <p:cond delay="0"/>
+                                  </p:stCondLst>
+                                  <p:childTnLst>
+                                    <p:animEffect transition="out" filter="fade">
+                                      <p:cBhvr>
+                                        <p:cTn id="35" dur="500"/>
+                                        <p:tgtEl>
+                                          <p:spTgt spid="11"/>
+                                        </p:tgtEl>
+                                      </p:cBhvr>
+                                    </p:animEffect>
+                                    <p:set>
+                                      <p:cBhvr>
+                                        <p:cTn id="36" dur="1" fill="hold">
+                                          <p:stCondLst>
+                                            <p:cond delay="499"/>
+                                          </p:stCondLst>
+                                        </p:cTn>
+                                        <p:tgtEl>
+                                          <p:spTgt spid="11"/>
+                                        </p:tgtEl>
+                                        <p:attrNameLst>
+                                          <p:attrName>style.visibility</p:attrName>
+                                        </p:attrNameLst>
+                                      </p:cBhvr>
+                                      <p:to>
+                                        <p:strVal val="hidden"/>
+                                      </p:to>
+                                    </p:set>
+                                  </p:childTnLst>
+                                </p:cTn>
+                              </p:par>
+                            </p:childTnLst>
+                          </p:cTn>
+                        </p:par>
+                      </p:childTnLst>
+                    </p:cTn>
+                  </p:par>
+                </p:childTnLst>
+              </p:cTn>
+              <p:prevCondLst>
+                <p:cond evt="onPrev" delay="0">
+                  <p:tgtEl>
+                    <p:sldTgt/>
+                  </p:tgtEl>
+                </p:cond>
+              </p:prevCondLst>
+              <p:nextCondLst>
+                <p:cond evt="onNext" delay="0">
+                  <p:tgtEl>
+                    <p:sldTgt/>
+                  </p:tgtEl>
+                </p:cond>
+              </p:nextCondLst>
+            </p:seq>
+          </p:childTnLst>
+        </p:cTn>
+      </p:par>
+    </p:tnLst>
+    <p:bldLst>
+      <p:bldP spid="11" grpId="0" animBg="1"/>
+      <p:bldP spid="11" grpId="1" animBg="1"/>
+    </p:bldLst>
+  </p:timing>
+</p:sld>
+</file>
+
+<file path=ppt/slides/slide3.xml><?xml version="1.0" encoding="utf-8"?>
+<p:sld xmlns:a="http://schemas.openxmlformats.org/drawingml/2006/main" xmlns:r="http://schemas.openxmlformats.org/officeDocument/2006/relationships" xmlns:p="http://schemas.openxmlformats.org/presentationml/2006/main">
+  <p:cSld>
+    <p:spTree>
+      <p:nvGrpSpPr>
+        <p:cNvPr id="1" name=""/>
+        <p:cNvGrpSpPr/>
+        <p:nvPr/>
+      </p:nvGrpSpPr>
+      <p:grpSpPr>
+        <a:xfrm>
+          <a:off x="0" y="0"/>
+          <a:ext cx="0" cy="0"/>
+          <a:chOff x="0" y="0"/>
+          <a:chExt cx="0" cy="0"/>
+        </a:xfrm>
+      </p:grpSpPr>
+      <p:pic>
+        <p:nvPicPr>
+          <p:cNvPr id="14" name="Рисунок 13"/>
+          <p:cNvPicPr>
+            <a:picLocks noChangeAspect="1"/>
+          </p:cNvPicPr>
+          <p:nvPr/>
+        </p:nvPicPr>
+        <p:blipFill>
+          <a:blip r:embed="rId2" cstate="print">
+            <a:extLst>
+              <a:ext uri="{28A0092B-C50C-407E-A947-70E740481C1C}">
+                <a14:useLocalDpi xmlns:a14="http://schemas.microsoft.com/office/drawing/2010/main" val="0"/>
+              </a:ext>
+            </a:extLst>
+          </a:blip>
+          <a:stretch>
+            <a:fillRect/>
+          </a:stretch>
+        </p:blipFill>
+        <p:spPr>
+          <a:xfrm>
+            <a:off x="3212078" y="3855281"/>
+            <a:ext cx="2540131" cy="2540131"/>
+          </a:xfrm>
+          <a:prstGeom prst="rect">
+            <a:avLst/>
+          </a:prstGeom>
+        </p:spPr>
+      </p:pic>
+      <p:pic>
+        <p:nvPicPr>
+          <p:cNvPr id="15" name="Рисунок 14"/>
+          <p:cNvPicPr>
+            <a:picLocks noChangeAspect="1"/>
+          </p:cNvPicPr>
+          <p:nvPr/>
+        </p:nvPicPr>
+        <p:blipFill>
+          <a:blip r:embed="rId3">
+            <a:extLst>
+              <a:ext uri="{28A0092B-C50C-407E-A947-70E740481C1C}">
+                <a14:useLocalDpi xmlns:a14="http://schemas.microsoft.com/office/drawing/2010/main" val="0"/>
+              </a:ext>
+            </a:extLst>
+          </a:blip>
+          <a:stretch>
+            <a:fillRect/>
+          </a:stretch>
+        </p:blipFill>
+        <p:spPr>
+          <a:xfrm>
+            <a:off x="9439826" y="3766752"/>
+            <a:ext cx="2799657" cy="2799657"/>
+          </a:xfrm>
+          <a:prstGeom prst="rect">
+            <a:avLst/>
+          </a:prstGeom>
+        </p:spPr>
+      </p:pic>
+      <p:pic>
+        <p:nvPicPr>
+          <p:cNvPr id="16" name="Рисунок 15"/>
+          <p:cNvPicPr>
+            <a:picLocks noChangeAspect="1"/>
+          </p:cNvPicPr>
+          <p:nvPr/>
+        </p:nvPicPr>
+        <p:blipFill>
+          <a:blip r:embed="rId4">
+            <a:extLst>
+              <a:ext uri="{28A0092B-C50C-407E-A947-70E740481C1C}">
+                <a14:useLocalDpi xmlns:a14="http://schemas.microsoft.com/office/drawing/2010/main" val="0"/>
+              </a:ext>
+            </a:extLst>
+          </a:blip>
+          <a:stretch>
+            <a:fillRect/>
+          </a:stretch>
+        </p:blipFill>
+        <p:spPr>
+          <a:xfrm>
+            <a:off x="6749695" y="3679805"/>
+            <a:ext cx="2973552" cy="2973552"/>
+          </a:xfrm>
+          <a:prstGeom prst="rect">
+            <a:avLst/>
+          </a:prstGeom>
+        </p:spPr>
+      </p:pic>
+      <p:pic>
+        <p:nvPicPr>
+          <p:cNvPr id="17" name="Рисунок 16"/>
+          <p:cNvPicPr>
+            <a:picLocks noChangeAspect="1"/>
+          </p:cNvPicPr>
+          <p:nvPr/>
+        </p:nvPicPr>
+        <p:blipFill>
+          <a:blip r:embed="rId5">
+            <a:extLst>
+              <a:ext uri="{28A0092B-C50C-407E-A947-70E740481C1C}">
+                <a14:useLocalDpi xmlns:a14="http://schemas.microsoft.com/office/drawing/2010/main" val="0"/>
+              </a:ext>
+            </a:extLst>
+          </a:blip>
+          <a:stretch>
+            <a:fillRect/>
+          </a:stretch>
+        </p:blipFill>
+        <p:spPr>
+          <a:xfrm>
+            <a:off x="14078" y="3642581"/>
+            <a:ext cx="3048000" cy="3048000"/>
+          </a:xfrm>
+          <a:prstGeom prst="rect">
+            <a:avLst/>
+          </a:prstGeom>
+        </p:spPr>
+      </p:pic>
+      <p:pic>
+        <p:nvPicPr>
+          <p:cNvPr id="18" name="Рисунок 17"/>
+          <p:cNvPicPr>
+            <a:picLocks noChangeAspect="1"/>
+          </p:cNvPicPr>
+          <p:nvPr/>
+        </p:nvPicPr>
+        <p:blipFill>
+          <a:blip r:embed="rId6">
+            <a:extLst>
+              <a:ext uri="{28A0092B-C50C-407E-A947-70E740481C1C}">
+                <a14:useLocalDpi xmlns:a14="http://schemas.microsoft.com/office/drawing/2010/main" val="0"/>
+              </a:ext>
+            </a:extLst>
+          </a:blip>
+          <a:stretch>
+            <a:fillRect/>
+          </a:stretch>
+        </p:blipFill>
+        <p:spPr>
+          <a:xfrm>
+            <a:off x="9649729" y="331342"/>
+            <a:ext cx="2141418" cy="2141418"/>
+          </a:xfrm>
+          <a:prstGeom prst="rect">
+            <a:avLst/>
+          </a:prstGeom>
+        </p:spPr>
+      </p:pic>
+      <p:pic>
+        <p:nvPicPr>
+          <p:cNvPr id="19" name="Рисунок 18"/>
+          <p:cNvPicPr>
+            <a:picLocks noChangeAspect="1"/>
+          </p:cNvPicPr>
+          <p:nvPr/>
+        </p:nvPicPr>
+        <p:blipFill>
+          <a:blip r:embed="rId7" cstate="print">
+            <a:extLst>
+              <a:ext uri="{28A0092B-C50C-407E-A947-70E740481C1C}">
+                <a14:useLocalDpi xmlns:a14="http://schemas.microsoft.com/office/drawing/2010/main" val="0"/>
+              </a:ext>
+            </a:extLst>
+          </a:blip>
+          <a:stretch>
+            <a:fillRect/>
+          </a:stretch>
+        </p:blipFill>
+        <p:spPr>
+          <a:xfrm>
+            <a:off x="7519295" y="605448"/>
+            <a:ext cx="1434351" cy="1835969"/>
+          </a:xfrm>
+          <a:prstGeom prst="rect">
+            <a:avLst/>
+          </a:prstGeom>
+        </p:spPr>
+      </p:pic>
+      <p:pic>
+        <p:nvPicPr>
+          <p:cNvPr id="20" name="Рисунок 19"/>
+          <p:cNvPicPr>
+            <a:picLocks noChangeAspect="1"/>
+          </p:cNvPicPr>
+          <p:nvPr/>
+        </p:nvPicPr>
+        <p:blipFill>
+          <a:blip r:embed="rId8" cstate="print">
+            <a:extLst>
+              <a:ext uri="{28A0092B-C50C-407E-A947-70E740481C1C}">
+                <a14:useLocalDpi xmlns:a14="http://schemas.microsoft.com/office/drawing/2010/main" val="0"/>
+              </a:ext>
+            </a:extLst>
+          </a:blip>
+          <a:stretch>
+            <a:fillRect/>
+          </a:stretch>
+        </p:blipFill>
+        <p:spPr>
+          <a:xfrm>
+            <a:off x="156099" y="605448"/>
+            <a:ext cx="2860927" cy="1957351"/>
+          </a:xfrm>
+          <a:prstGeom prst="rect">
+            <a:avLst/>
+          </a:prstGeom>
+        </p:spPr>
+      </p:pic>
+      <p:pic>
+        <p:nvPicPr>
+          <p:cNvPr id="21" name="Рисунок 20"/>
+          <p:cNvPicPr>
+            <a:picLocks noChangeAspect="1"/>
+          </p:cNvPicPr>
+          <p:nvPr/>
+        </p:nvPicPr>
+        <p:blipFill>
+          <a:blip r:embed="rId9">
+            <a:extLst>
+              <a:ext uri="{28A0092B-C50C-407E-A947-70E740481C1C}">
+                <a14:useLocalDpi xmlns:a14="http://schemas.microsoft.com/office/drawing/2010/main" val="0"/>
+              </a:ext>
+            </a:extLst>
+          </a:blip>
+          <a:stretch>
+            <a:fillRect/>
+          </a:stretch>
+        </p:blipFill>
+        <p:spPr>
+          <a:xfrm>
+            <a:off x="3212078" y="605448"/>
+            <a:ext cx="2540131" cy="1714588"/>
+          </a:xfrm>
+          <a:prstGeom prst="rect">
+            <a:avLst/>
+          </a:prstGeom>
+        </p:spPr>
+      </p:pic>
+    </p:spTree>
+    <p:extLst>
+      <p:ext uri="{BB962C8B-B14F-4D97-AF65-F5344CB8AC3E}">
+        <p14:creationId xmlns:p14="http://schemas.microsoft.com/office/powerpoint/2010/main" val="1208996410"/>
+      </p:ext>
+    </p:extLst>
+  </p:cSld>
+  <p:clrMapOvr>
+    <a:masterClrMapping/>
+  </p:clrMapOvr>
+  <p:timing>
+    <p:tnLst>
+      <p:par>
+        <p:cTn id="1" dur="indefinite" restart="never" nodeType="tmRoot">
+          <p:childTnLst>
+            <p:seq concurrent="1" nextAc="seek">
+              <p:cTn id="2" dur="indefinite" nodeType="mainSeq">
+                <p:childTnLst>
+                  <p:par>
+                    <p:cTn id="3" fill="hold">
+                      <p:stCondLst>
+                        <p:cond delay="indefinite"/>
+                        <p:cond evt="onBegin" delay="0">
+                          <p:tn val="2"/>
+                        </p:cond>
+                      </p:stCondLst>
+                      <p:childTnLst>
+                        <p:par>
+                          <p:cTn id="4" fill="hold">
+                            <p:stCondLst>
+                              <p:cond delay="0"/>
+                            </p:stCondLst>
+                            <p:childTnLst>
+                              <p:par>
+                                <p:cTn id="5" presetID="1" presetClass="entr" presetSubtype="0" fill="hold" nodeType="afterEffect">
+                                  <p:stCondLst>
+                                    <p:cond delay="0"/>
+                                  </p:stCondLst>
+                                  <p:childTnLst>
+                                    <p:set>
+                                      <p:cBhvr>
+                                        <p:cTn id="6" dur="1" fill="hold">
+                                          <p:stCondLst>
+                                            <p:cond delay="0"/>
+                                          </p:stCondLst>
+                                        </p:cTn>
+                                        <p:tgtEl>
+                                          <p:spTgt spid="20"/>
+                                        </p:tgtEl>
+                                        <p:attrNameLst>
+                                          <p:attrName>style.visibility</p:attrName>
+                                        </p:attrNameLst>
+                                      </p:cBhvr>
+                                      <p:to>
+                                        <p:strVal val="visible"/>
+                                      </p:to>
+                                    </p:set>
+                                  </p:childTnLst>
+                                </p:cTn>
+                              </p:par>
+                              <p:par>
+                                <p:cTn id="7" presetID="10" presetClass="entr" presetSubtype="0" fill="hold" nodeType="withEffect">
+                                  <p:stCondLst>
+                                    <p:cond delay="250"/>
+                                  </p:stCondLst>
+                                  <p:childTnLst>
+                                    <p:set>
+                                      <p:cBhvr>
+                                        <p:cTn id="8" dur="1" fill="hold">
+                                          <p:stCondLst>
+                                            <p:cond delay="0"/>
+                                          </p:stCondLst>
+                                        </p:cTn>
+                                        <p:tgtEl>
+                                          <p:spTgt spid="16"/>
+                                        </p:tgtEl>
+                                        <p:attrNameLst>
+                                          <p:attrName>style.visibility</p:attrName>
+                                        </p:attrNameLst>
+                                      </p:cBhvr>
+                                      <p:to>
+                                        <p:strVal val="visible"/>
+                                      </p:to>
+                                    </p:set>
+                                    <p:animEffect transition="in" filter="fade">
+                                      <p:cBhvr>
+                                        <p:cTn id="9" dur="500"/>
+                                        <p:tgtEl>
+                                          <p:spTgt spid="16"/>
+                                        </p:tgtEl>
+                                      </p:cBhvr>
+                                    </p:animEffect>
+                                  </p:childTnLst>
+                                </p:cTn>
+                              </p:par>
+                              <p:par>
+                                <p:cTn id="10" presetID="10" presetClass="entr" presetSubtype="0" fill="hold" nodeType="withEffect">
+                                  <p:stCondLst>
+                                    <p:cond delay="500"/>
+                                  </p:stCondLst>
+                                  <p:childTnLst>
+                                    <p:set>
+                                      <p:cBhvr>
+                                        <p:cTn id="11" dur="1" fill="hold">
+                                          <p:stCondLst>
+                                            <p:cond delay="0"/>
+                                          </p:stCondLst>
+                                        </p:cTn>
+                                        <p:tgtEl>
+                                          <p:spTgt spid="14"/>
+                                        </p:tgtEl>
+                                        <p:attrNameLst>
+                                          <p:attrName>style.visibility</p:attrName>
+                                        </p:attrNameLst>
+                                      </p:cBhvr>
+                                      <p:to>
+                                        <p:strVal val="visible"/>
+                                      </p:to>
+                                    </p:set>
+                                    <p:animEffect transition="in" filter="fade">
+                                      <p:cBhvr>
+                                        <p:cTn id="12" dur="500"/>
+                                        <p:tgtEl>
+                                          <p:spTgt spid="14"/>
+                                        </p:tgtEl>
+                                      </p:cBhvr>
+                                    </p:animEffect>
+                                  </p:childTnLst>
+                                </p:cTn>
+                              </p:par>
+                              <p:par>
+                                <p:cTn id="13" presetID="10" presetClass="entr" presetSubtype="0" fill="hold" nodeType="withEffect">
+                                  <p:stCondLst>
+                                    <p:cond delay="750"/>
+                                  </p:stCondLst>
+                                  <p:childTnLst>
+                                    <p:set>
+                                      <p:cBhvr>
+                                        <p:cTn id="14" dur="1" fill="hold">
+                                          <p:stCondLst>
+                                            <p:cond delay="0"/>
+                                          </p:stCondLst>
+                                        </p:cTn>
+                                        <p:tgtEl>
+                                          <p:spTgt spid="19"/>
+                                        </p:tgtEl>
+                                        <p:attrNameLst>
+                                          <p:attrName>style.visibility</p:attrName>
+                                        </p:attrNameLst>
+                                      </p:cBhvr>
+                                      <p:to>
+                                        <p:strVal val="visible"/>
+                                      </p:to>
+                                    </p:set>
+                                    <p:animEffect transition="in" filter="fade">
+                                      <p:cBhvr>
+                                        <p:cTn id="15" dur="500"/>
+                                        <p:tgtEl>
+                                          <p:spTgt spid="19"/>
+                                        </p:tgtEl>
+                                      </p:cBhvr>
+                                    </p:animEffect>
+                                  </p:childTnLst>
+                                </p:cTn>
+                              </p:par>
+                              <p:par>
+                                <p:cTn id="16" presetID="10" presetClass="entr" presetSubtype="0" fill="hold" nodeType="withEffect">
+                                  <p:stCondLst>
+                                    <p:cond delay="1000"/>
+                                  </p:stCondLst>
+                                  <p:childTnLst>
+                                    <p:set>
+                                      <p:cBhvr>
+                                        <p:cTn id="17" dur="1" fill="hold">
+                                          <p:stCondLst>
+                                            <p:cond delay="0"/>
+                                          </p:stCondLst>
+                                        </p:cTn>
+                                        <p:tgtEl>
+                                          <p:spTgt spid="15"/>
+                                        </p:tgtEl>
+                                        <p:attrNameLst>
+                                          <p:attrName>style.visibility</p:attrName>
+                                        </p:attrNameLst>
+                                      </p:cBhvr>
+                                      <p:to>
+                                        <p:strVal val="visible"/>
+                                      </p:to>
+                                    </p:set>
+                                    <p:animEffect transition="in" filter="fade">
+                                      <p:cBhvr>
+                                        <p:cTn id="18" dur="500"/>
+                                        <p:tgtEl>
+                                          <p:spTgt spid="15"/>
+                                        </p:tgtEl>
+                                      </p:cBhvr>
+                                    </p:animEffect>
+                                  </p:childTnLst>
+                                </p:cTn>
+                              </p:par>
+                              <p:par>
+                                <p:cTn id="19" presetID="10" presetClass="entr" presetSubtype="0" fill="hold" nodeType="withEffect">
+                                  <p:stCondLst>
+                                    <p:cond delay="1250"/>
+                                  </p:stCondLst>
+                                  <p:childTnLst>
+                                    <p:set>
+                                      <p:cBhvr>
+                                        <p:cTn id="20" dur="1" fill="hold">
+                                          <p:stCondLst>
+                                            <p:cond delay="0"/>
+                                          </p:stCondLst>
+                                        </p:cTn>
+                                        <p:tgtEl>
+                                          <p:spTgt spid="18"/>
+                                        </p:tgtEl>
+                                        <p:attrNameLst>
+                                          <p:attrName>style.visibility</p:attrName>
+                                        </p:attrNameLst>
+                                      </p:cBhvr>
+                                      <p:to>
+                                        <p:strVal val="visible"/>
+                                      </p:to>
+                                    </p:set>
+                                    <p:animEffect transition="in" filter="fade">
+                                      <p:cBhvr>
+                                        <p:cTn id="21" dur="500"/>
+                                        <p:tgtEl>
+                                          <p:spTgt spid="18"/>
+                                        </p:tgtEl>
+                                      </p:cBhvr>
+                                    </p:animEffect>
+                                  </p:childTnLst>
+                                </p:cTn>
+                              </p:par>
+                              <p:par>
+                                <p:cTn id="22" presetID="10" presetClass="entr" presetSubtype="0" fill="hold" nodeType="withEffect">
+                                  <p:stCondLst>
+                                    <p:cond delay="1500"/>
+                                  </p:stCondLst>
+                                  <p:childTnLst>
+                                    <p:set>
+                                      <p:cBhvr>
+                                        <p:cTn id="23" dur="1" fill="hold">
+                                          <p:stCondLst>
+                                            <p:cond delay="0"/>
+                                          </p:stCondLst>
+                                        </p:cTn>
+                                        <p:tgtEl>
+                                          <p:spTgt spid="17"/>
+                                        </p:tgtEl>
+                                        <p:attrNameLst>
+                                          <p:attrName>style.visibility</p:attrName>
+                                        </p:attrNameLst>
+                                      </p:cBhvr>
+                                      <p:to>
+                                        <p:strVal val="visible"/>
+                                      </p:to>
+                                    </p:set>
+                                    <p:animEffect transition="in" filter="fade">
+                                      <p:cBhvr>
+                                        <p:cTn id="24" dur="500"/>
+                                        <p:tgtEl>
+                                          <p:spTgt spid="17"/>
+                                        </p:tgtEl>
+                                      </p:cBhvr>
+                                    </p:animEffect>
+                                  </p:childTnLst>
+                                </p:cTn>
+                              </p:par>
+                              <p:par>
+                                <p:cTn id="25" presetID="10" presetClass="entr" presetSubtype="0" fill="hold" nodeType="withEffect">
+                                  <p:stCondLst>
+                                    <p:cond delay="1750"/>
+                                  </p:stCondLst>
+                                  <p:childTnLst>
+                                    <p:set>
+                                      <p:cBhvr>
+                                        <p:cTn id="26" dur="1" fill="hold">
+                                          <p:stCondLst>
+                                            <p:cond delay="0"/>
+                                          </p:stCondLst>
+                                        </p:cTn>
+                                        <p:tgtEl>
+                                          <p:spTgt spid="21"/>
+                                        </p:tgtEl>
+                                        <p:attrNameLst>
+                                          <p:attrName>style.visibility</p:attrName>
+                                        </p:attrNameLst>
+                                      </p:cBhvr>
+                                      <p:to>
+                                        <p:strVal val="visible"/>
+                                      </p:to>
+                                    </p:set>
+                                    <p:animEffect transition="in" filter="fade">
+                                      <p:cBhvr>
+                                        <p:cTn id="27" dur="500"/>
+                                        <p:tgtEl>
+                                          <p:spTgt spid="21"/>
+                                        </p:tgtEl>
+                                      </p:cBhvr>
+                                    </p:animEffect>
+                                  </p:childTnLst>
+                                </p:cTn>
+                              </p:par>
+                            </p:childTnLst>
+                          </p:cTn>
+                        </p:par>
+                      </p:childTnLst>
+                    </p:cTn>
+                  </p:par>
+                  <p:par>
+                    <p:cTn id="28" fill="hold">
+                      <p:stCondLst>
+                        <p:cond delay="indefinite"/>
+                      </p:stCondLst>
+                      <p:childTnLst>
+                        <p:par>
+                          <p:cTn id="29" fill="hold">
+                            <p:stCondLst>
+                              <p:cond delay="0"/>
+                            </p:stCondLst>
+                            <p:childTnLst>
+                              <p:par>
+                                <p:cTn id="30" presetID="10" presetClass="exit" presetSubtype="0" fill="hold" nodeType="clickEffect">
+                                  <p:stCondLst>
+                                    <p:cond delay="0"/>
+                                  </p:stCondLst>
+                                  <p:childTnLst>
+                                    <p:animEffect transition="out" filter="fade">
+                                      <p:cBhvr>
+                                        <p:cTn id="31" dur="500"/>
+                                        <p:tgtEl>
+                                          <p:spTgt spid="20"/>
+                                        </p:tgtEl>
+                                      </p:cBhvr>
+                                    </p:animEffect>
+                                    <p:set>
+                                      <p:cBhvr>
+                                        <p:cTn id="32" dur="1" fill="hold">
+                                          <p:stCondLst>
+                                            <p:cond delay="499"/>
+                                          </p:stCondLst>
+                                        </p:cTn>
+                                        <p:tgtEl>
+                                          <p:spTgt spid="20"/>
+                                        </p:tgtEl>
+                                        <p:attrNameLst>
+                                          <p:attrName>style.visibility</p:attrName>
+                                        </p:attrNameLst>
+                                      </p:cBhvr>
+                                      <p:to>
+                                        <p:strVal val="hidden"/>
+                                      </p:to>
+                                    </p:set>
+                                  </p:childTnLst>
+                                </p:cTn>
+                              </p:par>
+                              <p:par>
+                                <p:cTn id="33" presetID="10" presetClass="exit" presetSubtype="0" fill="hold" nodeType="withEffect">
+                                  <p:stCondLst>
+                                    <p:cond delay="0"/>
+                                  </p:stCondLst>
+                                  <p:childTnLst>
+                                    <p:animEffect transition="out" filter="fade">
+                                      <p:cBhvr>
+                                        <p:cTn id="34" dur="500"/>
+                                        <p:tgtEl>
+                                          <p:spTgt spid="16"/>
+                                        </p:tgtEl>
+                                      </p:cBhvr>
+                                    </p:animEffect>
+                                    <p:set>
+                                      <p:cBhvr>
+                                        <p:cTn id="35" dur="1" fill="hold">
+                                          <p:stCondLst>
+                                            <p:cond delay="499"/>
+                                          </p:stCondLst>
+                                        </p:cTn>
+                                        <p:tgtEl>
+                                          <p:spTgt spid="16"/>
+                                        </p:tgtEl>
+                                        <p:attrNameLst>
+                                          <p:attrName>style.visibility</p:attrName>
+                                        </p:attrNameLst>
+                                      </p:cBhvr>
+                                      <p:to>
+                                        <p:strVal val="hidden"/>
+                                      </p:to>
+                                    </p:set>
+                                  </p:childTnLst>
+                                </p:cTn>
+                              </p:par>
+                              <p:par>
+                                <p:cTn id="36" presetID="10" presetClass="exit" presetSubtype="0" fill="hold" nodeType="withEffect">
+                                  <p:stCondLst>
+                                    <p:cond delay="0"/>
+                                  </p:stCondLst>
+                                  <p:childTnLst>
+                                    <p:animEffect transition="out" filter="fade">
+                                      <p:cBhvr>
+                                        <p:cTn id="37" dur="500"/>
+                                        <p:tgtEl>
+                                          <p:spTgt spid="14"/>
+                                        </p:tgtEl>
+                                      </p:cBhvr>
+                                    </p:animEffect>
+                                    <p:set>
+                                      <p:cBhvr>
+                                        <p:cTn id="38" dur="1" fill="hold">
+                                          <p:stCondLst>
+                                            <p:cond delay="499"/>
+                                          </p:stCondLst>
+                                        </p:cTn>
+                                        <p:tgtEl>
+                                          <p:spTgt spid="14"/>
+                                        </p:tgtEl>
+                                        <p:attrNameLst>
+                                          <p:attrName>style.visibility</p:attrName>
+                                        </p:attrNameLst>
+                                      </p:cBhvr>
+                                      <p:to>
+                                        <p:strVal val="hidden"/>
+                                      </p:to>
+                                    </p:set>
+                                  </p:childTnLst>
+                                </p:cTn>
+                              </p:par>
+                              <p:par>
+                                <p:cTn id="39" presetID="10" presetClass="exit" presetSubtype="0" fill="hold" nodeType="withEffect">
+                                  <p:stCondLst>
+                                    <p:cond delay="0"/>
+                                  </p:stCondLst>
+                                  <p:childTnLst>
+                                    <p:animEffect transition="out" filter="fade">
+                                      <p:cBhvr>
+                                        <p:cTn id="40" dur="500"/>
+                                        <p:tgtEl>
+                                          <p:spTgt spid="19"/>
+                                        </p:tgtEl>
+                                      </p:cBhvr>
+                                    </p:animEffect>
+                                    <p:set>
+                                      <p:cBhvr>
+                                        <p:cTn id="41" dur="1" fill="hold">
+                                          <p:stCondLst>
+                                            <p:cond delay="499"/>
+                                          </p:stCondLst>
+                                        </p:cTn>
+                                        <p:tgtEl>
+                                          <p:spTgt spid="19"/>
+                                        </p:tgtEl>
+                                        <p:attrNameLst>
+                                          <p:attrName>style.visibility</p:attrName>
+                                        </p:attrNameLst>
+                                      </p:cBhvr>
+                                      <p:to>
+                                        <p:strVal val="hidden"/>
+                                      </p:to>
+                                    </p:set>
+                                  </p:childTnLst>
+                                </p:cTn>
+                              </p:par>
+                              <p:par>
+                                <p:cTn id="42" presetID="10" presetClass="exit" presetSubtype="0" fill="hold" nodeType="withEffect">
+                                  <p:stCondLst>
+                                    <p:cond delay="0"/>
+                                  </p:stCondLst>
+                                  <p:childTnLst>
+                                    <p:animEffect transition="out" filter="fade">
+                                      <p:cBhvr>
+                                        <p:cTn id="43" dur="500"/>
+                                        <p:tgtEl>
+                                          <p:spTgt spid="15"/>
+                                        </p:tgtEl>
+                                      </p:cBhvr>
+                                    </p:animEffect>
+                                    <p:set>
+                                      <p:cBhvr>
+                                        <p:cTn id="44" dur="1" fill="hold">
+                                          <p:stCondLst>
+                                            <p:cond delay="499"/>
+                                          </p:stCondLst>
+                                        </p:cTn>
+                                        <p:tgtEl>
+                                          <p:spTgt spid="15"/>
+                                        </p:tgtEl>
+                                        <p:attrNameLst>
+                                          <p:attrName>style.visibility</p:attrName>
+                                        </p:attrNameLst>
+                                      </p:cBhvr>
+                                      <p:to>
+                                        <p:strVal val="hidden"/>
+                                      </p:to>
+                                    </p:set>
+                                  </p:childTnLst>
+                                </p:cTn>
+                              </p:par>
+                              <p:par>
+                                <p:cTn id="45" presetID="10" presetClass="exit" presetSubtype="0" fill="hold" nodeType="withEffect">
+                                  <p:stCondLst>
+                                    <p:cond delay="0"/>
+                                  </p:stCondLst>
+                                  <p:childTnLst>
+                                    <p:animEffect transition="out" filter="fade">
+                                      <p:cBhvr>
+                                        <p:cTn id="46" dur="500"/>
+                                        <p:tgtEl>
+                                          <p:spTgt spid="18"/>
+                                        </p:tgtEl>
+                                      </p:cBhvr>
+                                    </p:animEffect>
+                                    <p:set>
+                                      <p:cBhvr>
+                                        <p:cTn id="47" dur="1" fill="hold">
+                                          <p:stCondLst>
+                                            <p:cond delay="499"/>
+                                          </p:stCondLst>
+                                        </p:cTn>
+                                        <p:tgtEl>
+                                          <p:spTgt spid="18"/>
+                                        </p:tgtEl>
+                                        <p:attrNameLst>
+                                          <p:attrName>style.visibility</p:attrName>
+                                        </p:attrNameLst>
+                                      </p:cBhvr>
+                                      <p:to>
+                                        <p:strVal val="hidden"/>
+                                      </p:to>
+                                    </p:set>
+                                  </p:childTnLst>
+                                </p:cTn>
+                              </p:par>
+                              <p:par>
+                                <p:cTn id="48" presetID="10" presetClass="exit" presetSubtype="0" fill="hold" nodeType="withEffect">
+                                  <p:stCondLst>
+                                    <p:cond delay="0"/>
+                                  </p:stCondLst>
+                                  <p:childTnLst>
+                                    <p:animEffect transition="out" filter="fade">
+                                      <p:cBhvr>
+                                        <p:cTn id="49" dur="500"/>
+                                        <p:tgtEl>
+                                          <p:spTgt spid="17"/>
+                                        </p:tgtEl>
+                                      </p:cBhvr>
+                                    </p:animEffect>
+                                    <p:set>
+                                      <p:cBhvr>
+                                        <p:cTn id="50" dur="1" fill="hold">
+                                          <p:stCondLst>
+                                            <p:cond delay="499"/>
+                                          </p:stCondLst>
+                                        </p:cTn>
+                                        <p:tgtEl>
+                                          <p:spTgt spid="17"/>
+                                        </p:tgtEl>
+                                        <p:attrNameLst>
+                                          <p:attrName>style.visibility</p:attrName>
+                                        </p:attrNameLst>
+                                      </p:cBhvr>
+                                      <p:to>
+                                        <p:strVal val="hidden"/>
+                                      </p:to>
+                                    </p:set>
+                                  </p:childTnLst>
+                                </p:cTn>
+                              </p:par>
+                              <p:par>
+                                <p:cTn id="51" presetID="10" presetClass="exit" presetSubtype="0" fill="hold" nodeType="withEffect">
+                                  <p:stCondLst>
+                                    <p:cond delay="0"/>
+                                  </p:stCondLst>
+                                  <p:childTnLst>
+                                    <p:animEffect transition="out" filter="fade">
+                                      <p:cBhvr>
+                                        <p:cTn id="52" dur="500"/>
+                                        <p:tgtEl>
+                                          <p:spTgt spid="21"/>
+                                        </p:tgtEl>
+                                      </p:cBhvr>
+                                    </p:animEffect>
+                                    <p:set>
+                                      <p:cBhvr>
+                                        <p:cTn id="53" dur="1" fill="hold">
+                                          <p:stCondLst>
+                                            <p:cond delay="499"/>
+                                          </p:stCondLst>
+                                        </p:cTn>
+                                        <p:tgtEl>
+                                          <p:spTgt spid="21"/>
+                                        </p:tgtEl>
+                                        <p:attrNameLst>
+                                          <p:attrName>style.visibility</p:attrName>
+                                        </p:attrNameLst>
+                                      </p:cBhvr>
+                                      <p:to>
+                                        <p:strVal val="hidden"/>
+                                      </p:to>
+                                    </p:set>
+                                  </p:childTnLst>
+                                </p:cTn>
+                              </p:par>
+                            </p:childTnLst>
+                          </p:cTn>
+                        </p:par>
+                      </p:childTnLst>
+                    </p:cTn>
+                  </p:par>
+                </p:childTnLst>
+              </p:cTn>
+              <p:prevCondLst>
+                <p:cond evt="onPrev" delay="0">
+                  <p:tgtEl>
+                    <p:sldTgt/>
+                  </p:tgtEl>
+                </p:cond>
+              </p:prevCondLst>
+              <p:nextCondLst>
+                <p:cond evt="onNext" delay="0">
+                  <p:tgtEl>
+                    <p:sldTgt/>
+                  </p:tgtEl>
+                </p:cond>
+              </p:nextCondLst>
+            </p:seq>
+          </p:childTnLst>
+        </p:cTn>
+      </p:par>
+    </p:tnLst>
+  </p:timing>
+</p:sld>
+</file>
+
+<file path=ppt/slides/slide4.xml><?xml version="1.0" encoding="utf-8"?>
+<p:sld xmlns:a="http://schemas.openxmlformats.org/drawingml/2006/main" xmlns:r="http://schemas.openxmlformats.org/officeDocument/2006/relationships" xmlns:p="http://schemas.openxmlformats.org/presentationml/2006/main">
+  <p:cSld>
+    <p:spTree>
+      <p:nvGrpSpPr>
+        <p:cNvPr id="1" name=""/>
+        <p:cNvGrpSpPr/>
+        <p:nvPr/>
+      </p:nvGrpSpPr>
+      <p:grpSpPr>
+        <a:xfrm>
+          <a:off x="0" y="0"/>
+          <a:ext cx="0" cy="0"/>
+          <a:chOff x="0" y="0"/>
+          <a:chExt cx="0" cy="0"/>
+        </a:xfrm>
+      </p:grpSpPr>
+      <p:pic>
+        <p:nvPicPr>
           <p:cNvPr id="6" name="Рисунок 5"/>
           <p:cNvPicPr>
             <a:picLocks noGrp="1" noChangeAspect="1"/>
@@ -3839,7 +5304,7 @@
 </p:sld>
 </file>
 
-<file path=ppt/slides/slide3.xml><?xml version="1.0" encoding="utf-8"?>
+<file path=ppt/slides/slide5.xml><?xml version="1.0" encoding="utf-8"?>
 <p:sld xmlns:a="http://schemas.openxmlformats.org/drawingml/2006/main" xmlns:r="http://schemas.openxmlformats.org/officeDocument/2006/relationships" xmlns:p="http://schemas.openxmlformats.org/presentationml/2006/main">
   <p:cSld>
     <p:spTree>
@@ -4558,7 +6023,7 @@
 </p:sld>
 </file>
 
-<file path=ppt/slides/slide4.xml><?xml version="1.0" encoding="utf-8"?>
+<file path=ppt/slides/slide6.xml><?xml version="1.0" encoding="utf-8"?>
 <p:sld xmlns:a="http://schemas.openxmlformats.org/drawingml/2006/main" xmlns:r="http://schemas.openxmlformats.org/officeDocument/2006/relationships" xmlns:p="http://schemas.openxmlformats.org/presentationml/2006/main">
   <p:cSld>
     <p:spTree>
@@ -5261,7 +6726,7 @@
 </p:sld>
 </file>
 
-<file path=ppt/slides/slide5.xml><?xml version="1.0" encoding="utf-8"?>
+<file path=ppt/slides/slide7.xml><?xml version="1.0" encoding="utf-8"?>
 <p:sld xmlns:a="http://schemas.openxmlformats.org/drawingml/2006/main" xmlns:r="http://schemas.openxmlformats.org/officeDocument/2006/relationships" xmlns:p="http://schemas.openxmlformats.org/presentationml/2006/main">
   <p:cSld>
     <p:spTree>
@@ -5403,6 +6868,66 @@
           </a:p>
         </p:txBody>
       </p:sp>
+      <p:pic>
+        <p:nvPicPr>
+          <p:cNvPr id="2" name="Рисунок 1"/>
+          <p:cNvPicPr>
+            <a:picLocks noChangeAspect="1"/>
+          </p:cNvPicPr>
+          <p:nvPr/>
+        </p:nvPicPr>
+        <p:blipFill>
+          <a:blip r:embed="rId2" cstate="print">
+            <a:extLst>
+              <a:ext uri="{28A0092B-C50C-407E-A947-70E740481C1C}">
+                <a14:useLocalDpi xmlns:a14="http://schemas.microsoft.com/office/drawing/2010/main" val="0"/>
+              </a:ext>
+            </a:extLst>
+          </a:blip>
+          <a:stretch>
+            <a:fillRect/>
+          </a:stretch>
+        </p:blipFill>
+        <p:spPr>
+          <a:xfrm>
+            <a:off x="5701507" y="4048861"/>
+            <a:ext cx="255936" cy="149051"/>
+          </a:xfrm>
+          <a:prstGeom prst="rect">
+            <a:avLst/>
+          </a:prstGeom>
+        </p:spPr>
+      </p:pic>
+      <p:pic>
+        <p:nvPicPr>
+          <p:cNvPr id="5" name="Рисунок 4"/>
+          <p:cNvPicPr>
+            <a:picLocks noChangeAspect="1"/>
+          </p:cNvPicPr>
+          <p:nvPr/>
+        </p:nvPicPr>
+        <p:blipFill>
+          <a:blip r:embed="rId3" cstate="print">
+            <a:extLst>
+              <a:ext uri="{28A0092B-C50C-407E-A947-70E740481C1C}">
+                <a14:useLocalDpi xmlns:a14="http://schemas.microsoft.com/office/drawing/2010/main" val="0"/>
+              </a:ext>
+            </a:extLst>
+          </a:blip>
+          <a:stretch>
+            <a:fillRect/>
+          </a:stretch>
+        </p:blipFill>
+        <p:spPr>
+          <a:xfrm>
+            <a:off x="5263555" y="4048861"/>
+            <a:ext cx="298102" cy="149051"/>
+          </a:xfrm>
+          <a:prstGeom prst="rect">
+            <a:avLst/>
+          </a:prstGeom>
+        </p:spPr>
+      </p:pic>
     </p:spTree>
     <p:extLst>
       <p:ext uri="{BB962C8B-B14F-4D97-AF65-F5344CB8AC3E}">
@@ -5755,6 +7280,76 @@
                                   </p:childTnLst>
                                 </p:cTn>
                               </p:par>
+                              <p:par>
+                                <p:cTn id="31" presetID="10" presetClass="entr" presetSubtype="0" fill="hold" nodeType="withEffect">
+                                  <p:stCondLst>
+                                    <p:cond delay="0"/>
+                                  </p:stCondLst>
+                                  <p:childTnLst>
+                                    <p:set>
+                                      <p:cBhvr>
+                                        <p:cTn id="32" dur="1" fill="hold">
+                                          <p:stCondLst>
+                                            <p:cond delay="0"/>
+                                          </p:stCondLst>
+                                        </p:cTn>
+                                        <p:tgtEl>
+                                          <p:spTgt spid="5"/>
+                                        </p:tgtEl>
+                                        <p:attrNameLst>
+                                          <p:attrName>style.visibility</p:attrName>
+                                        </p:attrNameLst>
+                                      </p:cBhvr>
+                                      <p:to>
+                                        <p:strVal val="visible"/>
+                                      </p:to>
+                                    </p:set>
+                                    <p:animEffect transition="in" filter="fade">
+                                      <p:cBhvr>
+                                        <p:cTn id="33" dur="250"/>
+                                        <p:tgtEl>
+                                          <p:spTgt spid="5"/>
+                                        </p:tgtEl>
+                                      </p:cBhvr>
+                                    </p:animEffect>
+                                  </p:childTnLst>
+                                </p:cTn>
+                              </p:par>
+                              <p:par>
+                                <p:cTn id="34" presetID="10" presetClass="entr" presetSubtype="0" fill="hold" nodeType="withEffect">
+                                  <p:stCondLst>
+                                    <p:cond delay="0"/>
+                                  </p:stCondLst>
+                                  <p:childTnLst>
+                                    <p:set>
+                                      <p:cBhvr>
+                                        <p:cTn id="35" dur="1" fill="hold">
+                                          <p:stCondLst>
+                                            <p:cond delay="0"/>
+                                          </p:stCondLst>
+                                        </p:cTn>
+                                        <p:tgtEl>
+                                          <p:spTgt spid="2"/>
+                                        </p:tgtEl>
+                                        <p:attrNameLst>
+                                          <p:attrName>style.visibility</p:attrName>
+                                        </p:attrNameLst>
+                                      </p:cBhvr>
+                                      <p:to>
+                                        <p:strVal val="visible"/>
+                                      </p:to>
+                                    </p:set>
+                                    <p:animEffect transition="in" filter="fade">
+                                      <p:cBhvr>
+                                        <p:cTn id="36" dur="250"/>
+                                        <p:tgtEl>
+                                          <p:spTgt spid="2"/>
+                                        </p:tgtEl>
+                                      </p:cBhvr>
+                                    </p:animEffect>
+                                  </p:childTnLst>
+                                </p:cTn>
+                              </p:par>
                             </p:childTnLst>
                           </p:cTn>
                         </p:par>
@@ -5762,26 +7357,26 @@
                     </p:cTn>
                   </p:par>
                   <p:par>
-                    <p:cTn id="31" fill="hold">
+                    <p:cTn id="37" fill="hold">
                       <p:stCondLst>
                         <p:cond delay="indefinite"/>
                       </p:stCondLst>
                       <p:childTnLst>
                         <p:par>
-                          <p:cTn id="32" fill="hold">
+                          <p:cTn id="38" fill="hold">
                             <p:stCondLst>
                               <p:cond delay="0"/>
                             </p:stCondLst>
                             <p:childTnLst>
                               <p:par>
-                                <p:cTn id="33" presetID="10" presetClass="exit" presetSubtype="0" fill="hold" grpId="1" nodeType="clickEffect">
+                                <p:cTn id="39" presetID="10" presetClass="exit" presetSubtype="0" fill="hold" grpId="1" nodeType="clickEffect">
                                   <p:stCondLst>
                                     <p:cond delay="0"/>
                                   </p:stCondLst>
                                   <p:childTnLst>
                                     <p:animEffect transition="out" filter="fade">
                                       <p:cBhvr>
-                                        <p:cTn id="34" dur="250"/>
+                                        <p:cTn id="40" dur="250"/>
                                         <p:tgtEl>
                                           <p:spTgt spid="3">
                                             <p:txEl>
@@ -5793,101 +7388,15 @@
                                     </p:animEffect>
                                     <p:set>
                                       <p:cBhvr>
-                                        <p:cTn id="35" dur="1" fill="hold">
-                                          <p:stCondLst>
-                                            <p:cond delay="249"/>
-                                          </p:stCondLst>
-                                        </p:cTn>
-                                        <p:tgtEl>
-                                          <p:spTgt spid="3">
-                                            <p:txEl>
-                                              <p:pRg st="0" end="0"/>
-                                            </p:txEl>
-                                          </p:spTgt>
-                                        </p:tgtEl>
-                                        <p:attrNameLst>
-                                          <p:attrName>style.visibility</p:attrName>
-                                        </p:attrNameLst>
-                                      </p:cBhvr>
-                                      <p:to>
-                                        <p:strVal val="hidden"/>
-                                      </p:to>
-                                    </p:set>
-                                  </p:childTnLst>
-                                </p:cTn>
-                              </p:par>
-                              <p:par>
-                                <p:cTn id="36" presetID="10" presetClass="exit" presetSubtype="0" fill="hold" grpId="0" nodeType="withEffect">
-                                  <p:stCondLst>
-                                    <p:cond delay="0"/>
-                                  </p:stCondLst>
-                                  <p:childTnLst>
-                                    <p:animEffect transition="out" filter="fade">
-                                      <p:cBhvr>
-                                        <p:cTn id="37" dur="250"/>
-                                        <p:tgtEl>
-                                          <p:spTgt spid="4">
-                                            <p:txEl>
-                                              <p:pRg st="0" end="0"/>
-                                            </p:txEl>
-                                          </p:spTgt>
-                                        </p:tgtEl>
-                                      </p:cBhvr>
-                                    </p:animEffect>
-                                    <p:set>
-                                      <p:cBhvr>
-                                        <p:cTn id="38" dur="1" fill="hold">
-                                          <p:stCondLst>
-                                            <p:cond delay="249"/>
-                                          </p:stCondLst>
-                                        </p:cTn>
-                                        <p:tgtEl>
-                                          <p:spTgt spid="4">
-                                            <p:txEl>
-                                              <p:pRg st="0" end="0"/>
-                                            </p:txEl>
-                                          </p:spTgt>
-                                        </p:tgtEl>
-                                        <p:attrNameLst>
-                                          <p:attrName>style.visibility</p:attrName>
-                                        </p:attrNameLst>
-                                      </p:cBhvr>
-                                      <p:to>
-                                        <p:strVal val="hidden"/>
-                                      </p:to>
-                                    </p:set>
-                                  </p:childTnLst>
-                                </p:cTn>
-                              </p:par>
-                              <p:par>
-                                <p:cTn id="39" presetID="10" presetClass="exit" presetSubtype="0" fill="hold" grpId="0" nodeType="withEffect">
-                                  <p:stCondLst>
-                                    <p:cond delay="0"/>
-                                  </p:stCondLst>
-                                  <p:childTnLst>
-                                    <p:animEffect transition="out" filter="fade">
-                                      <p:cBhvr>
-                                        <p:cTn id="40" dur="250"/>
-                                        <p:tgtEl>
-                                          <p:spTgt spid="4">
-                                            <p:txEl>
-                                              <p:pRg st="1" end="1"/>
-                                            </p:txEl>
-                                          </p:spTgt>
-                                        </p:tgtEl>
-                                      </p:cBhvr>
-                                    </p:animEffect>
-                                    <p:set>
-                                      <p:cBhvr>
                                         <p:cTn id="41" dur="1" fill="hold">
                                           <p:stCondLst>
                                             <p:cond delay="249"/>
                                           </p:stCondLst>
                                         </p:cTn>
                                         <p:tgtEl>
-                                          <p:spTgt spid="4">
+                                          <p:spTgt spid="3">
                                             <p:txEl>
-                                              <p:pRg st="1" end="1"/>
+                                              <p:pRg st="0" end="0"/>
                                             </p:txEl>
                                           </p:spTgt>
                                         </p:tgtEl>
@@ -5914,7 +7423,7 @@
                                         <p:tgtEl>
                                           <p:spTgt spid="4">
                                             <p:txEl>
-                                              <p:pRg st="2" end="2"/>
+                                              <p:pRg st="0" end="0"/>
                                             </p:txEl>
                                           </p:spTgt>
                                         </p:tgtEl>
@@ -5930,7 +7439,7 @@
                                         <p:tgtEl>
                                           <p:spTgt spid="4">
                                             <p:txEl>
-                                              <p:pRg st="2" end="2"/>
+                                              <p:pRg st="0" end="0"/>
                                             </p:txEl>
                                           </p:spTgt>
                                         </p:tgtEl>
@@ -5957,7 +7466,7 @@
                                         <p:tgtEl>
                                           <p:spTgt spid="4">
                                             <p:txEl>
-                                              <p:pRg st="3" end="3"/>
+                                              <p:pRg st="1" end="1"/>
                                             </p:txEl>
                                           </p:spTgt>
                                         </p:tgtEl>
@@ -5973,9 +7482,165 @@
                                         <p:tgtEl>
                                           <p:spTgt spid="4">
                                             <p:txEl>
+                                              <p:pRg st="1" end="1"/>
+                                            </p:txEl>
+                                          </p:spTgt>
+                                        </p:tgtEl>
+                                        <p:attrNameLst>
+                                          <p:attrName>style.visibility</p:attrName>
+                                        </p:attrNameLst>
+                                      </p:cBhvr>
+                                      <p:to>
+                                        <p:strVal val="hidden"/>
+                                      </p:to>
+                                    </p:set>
+                                  </p:childTnLst>
+                                </p:cTn>
+                              </p:par>
+                              <p:par>
+                                <p:cTn id="48" presetID="10" presetClass="exit" presetSubtype="0" fill="hold" grpId="0" nodeType="withEffect">
+                                  <p:stCondLst>
+                                    <p:cond delay="0"/>
+                                  </p:stCondLst>
+                                  <p:childTnLst>
+                                    <p:animEffect transition="out" filter="fade">
+                                      <p:cBhvr>
+                                        <p:cTn id="49" dur="250"/>
+                                        <p:tgtEl>
+                                          <p:spTgt spid="4">
+                                            <p:txEl>
+                                              <p:pRg st="2" end="2"/>
+                                            </p:txEl>
+                                          </p:spTgt>
+                                        </p:tgtEl>
+                                      </p:cBhvr>
+                                    </p:animEffect>
+                                    <p:set>
+                                      <p:cBhvr>
+                                        <p:cTn id="50" dur="1" fill="hold">
+                                          <p:stCondLst>
+                                            <p:cond delay="249"/>
+                                          </p:stCondLst>
+                                        </p:cTn>
+                                        <p:tgtEl>
+                                          <p:spTgt spid="4">
+                                            <p:txEl>
+                                              <p:pRg st="2" end="2"/>
+                                            </p:txEl>
+                                          </p:spTgt>
+                                        </p:tgtEl>
+                                        <p:attrNameLst>
+                                          <p:attrName>style.visibility</p:attrName>
+                                        </p:attrNameLst>
+                                      </p:cBhvr>
+                                      <p:to>
+                                        <p:strVal val="hidden"/>
+                                      </p:to>
+                                    </p:set>
+                                  </p:childTnLst>
+                                </p:cTn>
+                              </p:par>
+                              <p:par>
+                                <p:cTn id="51" presetID="10" presetClass="exit" presetSubtype="0" fill="hold" grpId="0" nodeType="withEffect">
+                                  <p:stCondLst>
+                                    <p:cond delay="0"/>
+                                  </p:stCondLst>
+                                  <p:childTnLst>
+                                    <p:animEffect transition="out" filter="fade">
+                                      <p:cBhvr>
+                                        <p:cTn id="52" dur="250"/>
+                                        <p:tgtEl>
+                                          <p:spTgt spid="4">
+                                            <p:txEl>
                                               <p:pRg st="3" end="3"/>
                                             </p:txEl>
                                           </p:spTgt>
+                                        </p:tgtEl>
+                                      </p:cBhvr>
+                                    </p:animEffect>
+                                    <p:set>
+                                      <p:cBhvr>
+                                        <p:cTn id="53" dur="1" fill="hold">
+                                          <p:stCondLst>
+                                            <p:cond delay="249"/>
+                                          </p:stCondLst>
+                                        </p:cTn>
+                                        <p:tgtEl>
+                                          <p:spTgt spid="4">
+                                            <p:txEl>
+                                              <p:pRg st="3" end="3"/>
+                                            </p:txEl>
+                                          </p:spTgt>
+                                        </p:tgtEl>
+                                        <p:attrNameLst>
+                                          <p:attrName>style.visibility</p:attrName>
+                                        </p:attrNameLst>
+                                      </p:cBhvr>
+                                      <p:to>
+                                        <p:strVal val="hidden"/>
+                                      </p:to>
+                                    </p:set>
+                                  </p:childTnLst>
+                                </p:cTn>
+                              </p:par>
+                              <p:par>
+                                <p:cTn id="54" presetID="10" presetClass="exit" presetSubtype="0" fill="hold" nodeType="withEffect">
+                                  <p:stCondLst>
+                                    <p:cond delay="0"/>
+                                  </p:stCondLst>
+                                  <p:childTnLst>
+                                    <p:animEffect transition="out" filter="fade">
+                                      <p:cBhvr>
+                                        <p:cTn id="55" dur="250"/>
+                                        <p:tgtEl>
+                                          <p:spTgt spid="5"/>
+                                        </p:tgtEl>
+                                      </p:cBhvr>
+                                    </p:animEffect>
+                                    <p:set>
+                                      <p:cBhvr>
+                                        <p:cTn id="56" dur="1" fill="hold">
+                                          <p:stCondLst>
+                                            <p:cond delay="249"/>
+                                          </p:stCondLst>
+                                        </p:cTn>
+                                        <p:tgtEl>
+                                          <p:spTgt spid="5"/>
+                                        </p:tgtEl>
+                                        <p:attrNameLst>
+                                          <p:attrName>style.visibility</p:attrName>
+                                        </p:attrNameLst>
+                                      </p:cBhvr>
+                                      <p:to>
+                                        <p:strVal val="hidden"/>
+                                      </p:to>
+                                    </p:set>
+                                  </p:childTnLst>
+                                </p:cTn>
+                              </p:par>
+                              <p:par>
+                                <p:cTn id="57" presetID="10" presetClass="exit" presetSubtype="0" fill="hold" nodeType="withEffect">
+                                  <p:stCondLst>
+                                    <p:cond delay="0"/>
+                                  </p:stCondLst>
+                                  <p:childTnLst>
+                                    <p:animEffect transition="out" filter="fade">
+                                      <p:cBhvr>
+                                        <p:cTn id="58" dur="250"/>
+                                        <p:tgtEl>
+                                          <p:spTgt spid="2"/>
+                                        </p:tgtEl>
+                                      </p:cBhvr>
+                                    </p:animEffect>
+                                    <p:set>
+                                      <p:cBhvr>
+                                        <p:cTn id="59" dur="1" fill="hold">
+                                          <p:stCondLst>
+                                            <p:cond delay="249"/>
+                                          </p:stCondLst>
+                                        </p:cTn>
+                                        <p:tgtEl>
+                                          <p:spTgt spid="2"/>
                                         </p:tgtEl>
                                         <p:attrNameLst>
                                           <p:attrName>style.visibility</p:attrName>
@@ -6025,7 +7690,7 @@
 </p:sld>
 </file>
 
-<file path=ppt/slides/slide6.xml><?xml version="1.0" encoding="utf-8"?>
+<file path=ppt/slides/slide8.xml><?xml version="1.0" encoding="utf-8"?>
 <p:sld xmlns:a="http://schemas.openxmlformats.org/drawingml/2006/main" xmlns:r="http://schemas.openxmlformats.org/officeDocument/2006/relationships" xmlns:p="http://schemas.openxmlformats.org/presentationml/2006/main">
   <p:cSld>
     <p:spTree>
@@ -6929,7 +8594,7 @@
 </p:sld>
 </file>
 
-<file path=ppt/slides/slide7.xml><?xml version="1.0" encoding="utf-8"?>
+<file path=ppt/slides/slide9.xml><?xml version="1.0" encoding="utf-8"?>
 <p:sld xmlns:a="http://schemas.openxmlformats.org/drawingml/2006/main" xmlns:r="http://schemas.openxmlformats.org/officeDocument/2006/relationships" xmlns:p="http://schemas.openxmlformats.org/presentationml/2006/main">
   <p:cSld>
     <p:spTree>

</xml_diff>